<commit_message>
Tutorial, messar simple processing
</commit_message>
<xml_diff>
--- a/inst/tmp.pptx
+++ b/inst/tmp.pptx
@@ -5,7 +5,7 @@
     <p:sldMasterId id="2147483648" r:id="rId1"/>
   </p:sldMasterIdLst>
   <p:notesMasterIdLst>
-    <p:notesMasterId r:id="rId9"/>
+    <p:notesMasterId r:id="rId10"/>
   </p:notesMasterIdLst>
   <p:sldIdLst>
     <p:sldId id="256" r:id="rId2"/>
@@ -15,6 +15,7 @@
     <p:sldId id="265" r:id="rId6"/>
     <p:sldId id="267" r:id="rId7"/>
     <p:sldId id="268" r:id="rId8"/>
+    <p:sldId id="269" r:id="rId9"/>
   </p:sldIdLst>
   <p:sldSz cx="12192000" cy="6858000"/>
   <p:notesSz cx="6858000" cy="9144000"/>
@@ -6682,10 +6683,156 @@
           <a:chExt cx="0" cy="0"/>
         </a:xfrm>
       </p:grpSpPr>
+      <p:pic>
+        <p:nvPicPr>
+          <p:cNvPr id="2" name="Image 1">
+            <a:extLst>
+              <a:ext uri="{FF2B5EF4-FFF2-40B4-BE49-F238E27FC236}">
+                <a16:creationId xmlns:a16="http://schemas.microsoft.com/office/drawing/2014/main" id="{4FB293FA-1E0C-433D-8A51-595E823EBD37}"/>
+              </a:ext>
+            </a:extLst>
+          </p:cNvPr>
+          <p:cNvPicPr>
+            <a:picLocks noChangeAspect="1"/>
+          </p:cNvPicPr>
+          <p:nvPr/>
+        </p:nvPicPr>
+        <p:blipFill rotWithShape="1">
+          <a:blip r:embed="rId2"/>
+          <a:srcRect l="3820" t="18975" r="7051" b="10933"/>
+          <a:stretch/>
+        </p:blipFill>
+        <p:spPr>
+          <a:xfrm>
+            <a:off x="1859972" y="1423555"/>
+            <a:ext cx="6431973" cy="4130003"/>
+          </a:xfrm>
+          <a:prstGeom prst="rect">
+            <a:avLst/>
+          </a:prstGeom>
+        </p:spPr>
+      </p:pic>
     </p:spTree>
     <p:extLst>
       <p:ext uri="{BB962C8B-B14F-4D97-AF65-F5344CB8AC3E}">
         <p14:creationId xmlns:p14="http://schemas.microsoft.com/office/powerpoint/2010/main" val="3184723136"/>
+      </p:ext>
+    </p:extLst>
+  </p:cSld>
+  <p:clrMapOvr>
+    <a:masterClrMapping/>
+  </p:clrMapOvr>
+</p:sld>
+</file>
+
+<file path=ppt/slides/slide8.xml><?xml version="1.0" encoding="utf-8"?>
+<p:sld xmlns:a="http://schemas.openxmlformats.org/drawingml/2006/main" xmlns:r="http://schemas.openxmlformats.org/officeDocument/2006/relationships" xmlns:p="http://schemas.openxmlformats.org/presentationml/2006/main">
+  <p:cSld>
+    <p:spTree>
+      <p:nvGrpSpPr>
+        <p:cNvPr id="1" name=""/>
+        <p:cNvGrpSpPr/>
+        <p:nvPr/>
+      </p:nvGrpSpPr>
+      <p:grpSpPr>
+        <a:xfrm>
+          <a:off x="0" y="0"/>
+          <a:ext cx="0" cy="0"/>
+          <a:chOff x="0" y="0"/>
+          <a:chExt cx="0" cy="0"/>
+        </a:xfrm>
+      </p:grpSpPr>
+      <p:pic>
+        <p:nvPicPr>
+          <p:cNvPr id="4" name="Image 3">
+            <a:extLst>
+              <a:ext uri="{FF2B5EF4-FFF2-40B4-BE49-F238E27FC236}">
+                <a16:creationId xmlns:a16="http://schemas.microsoft.com/office/drawing/2014/main" id="{6C19478E-F45E-40A6-8A0B-C78546DF4832}"/>
+              </a:ext>
+            </a:extLst>
+          </p:cNvPr>
+          <p:cNvPicPr>
+            <a:picLocks noChangeAspect="1"/>
+          </p:cNvPicPr>
+          <p:nvPr/>
+        </p:nvPicPr>
+        <p:blipFill rotWithShape="1">
+          <a:blip r:embed="rId2"/>
+          <a:srcRect l="1943" t="19567" r="3924" b="9959"/>
+          <a:stretch/>
+        </p:blipFill>
+        <p:spPr>
+          <a:xfrm>
+            <a:off x="1288473" y="635120"/>
+            <a:ext cx="4462955" cy="2728185"/>
+          </a:xfrm>
+          <a:prstGeom prst="rect">
+            <a:avLst/>
+          </a:prstGeom>
+        </p:spPr>
+      </p:pic>
+      <p:pic>
+        <p:nvPicPr>
+          <p:cNvPr id="5" name="Image 4">
+            <a:extLst>
+              <a:ext uri="{FF2B5EF4-FFF2-40B4-BE49-F238E27FC236}">
+                <a16:creationId xmlns:a16="http://schemas.microsoft.com/office/drawing/2014/main" id="{284C9446-8711-4695-A6CC-73B0BAE2051E}"/>
+              </a:ext>
+            </a:extLst>
+          </p:cNvPr>
+          <p:cNvPicPr>
+            <a:picLocks noChangeAspect="1"/>
+          </p:cNvPicPr>
+          <p:nvPr/>
+        </p:nvPicPr>
+        <p:blipFill rotWithShape="1">
+          <a:blip r:embed="rId3"/>
+          <a:srcRect l="4446" t="18210" r="5866" b="7869"/>
+          <a:stretch/>
+        </p:blipFill>
+        <p:spPr>
+          <a:xfrm>
+            <a:off x="5507181" y="635120"/>
+            <a:ext cx="4208318" cy="2832094"/>
+          </a:xfrm>
+          <a:prstGeom prst="rect">
+            <a:avLst/>
+          </a:prstGeom>
+        </p:spPr>
+      </p:pic>
+      <p:pic>
+        <p:nvPicPr>
+          <p:cNvPr id="2" name="Image 1">
+            <a:extLst>
+              <a:ext uri="{FF2B5EF4-FFF2-40B4-BE49-F238E27FC236}">
+                <a16:creationId xmlns:a16="http://schemas.microsoft.com/office/drawing/2014/main" id="{A156D9A5-439B-4650-B5F4-E8FA93D9160A}"/>
+              </a:ext>
+            </a:extLst>
+          </p:cNvPr>
+          <p:cNvPicPr>
+            <a:picLocks noChangeAspect="1"/>
+          </p:cNvPicPr>
+          <p:nvPr/>
+        </p:nvPicPr>
+        <p:blipFill rotWithShape="1">
+          <a:blip r:embed="rId4"/>
+          <a:srcRect l="11607" t="6673" r="2914" b="23664"/>
+          <a:stretch/>
+        </p:blipFill>
+        <p:spPr>
+          <a:xfrm>
+            <a:off x="2441865" y="3844636"/>
+            <a:ext cx="5305888" cy="2628900"/>
+          </a:xfrm>
+          <a:prstGeom prst="rect">
+            <a:avLst/>
+          </a:prstGeom>
+        </p:spPr>
+      </p:pic>
+    </p:spTree>
+    <p:extLst>
+      <p:ext uri="{BB962C8B-B14F-4D97-AF65-F5344CB8AC3E}">
+        <p14:creationId xmlns:p14="http://schemas.microsoft.com/office/powerpoint/2010/main" val="724617817"/>
       </p:ext>
     </p:extLst>
   </p:cSld>

</xml_diff>